<commit_message>
Edits on the Slide deck
Modified reccomendation on key findings. Added captions.  Changed conclusion
</commit_message>
<xml_diff>
--- a/Guided Capstone Slide Deck.pptx
+++ b/Guided Capstone Slide Deck.pptx
@@ -263,7 +263,7 @@
       </p15:sldGuideLst>
     </p:ext>
     <p:ext uri="http://customooxmlschemas.google.com/">
-      <go:slidesCustomData xmlns:go="http://customooxmlschemas.google.com/" xmlns:p15="http://schemas.microsoft.com/office/powerpoint/2012/main" xmlns:p14="http://schemas.microsoft.com/office/powerpoint/2010/main" xmlns:com="http://schemas.openxmlformats.org/drawingml/2006/compatibility" xmlns:pvml="urn:schemas-microsoft-com:office:powerpoint" xmlns:v="urn:schemas-microsoft-com:vml" xmlns:o="urn:schemas-microsoft-com:office:office" xmlns:dgm="http://schemas.openxmlformats.org/drawingml/2006/diagram" xmlns:c="http://schemas.openxmlformats.org/drawingml/2006/chart" xmlns:mv="urn:schemas-microsoft-com:mac:vml" xmlns:mc="http://schemas.openxmlformats.org/markup-compatibility/2006" xmlns="" r:id="rId10" roundtripDataSignature="AMtx7mjdo7FECp685JsX7/4pIVeoAktjNA=="/>
+      <go:slidesCustomData xmlns="" xmlns:mc="http://schemas.openxmlformats.org/markup-compatibility/2006" xmlns:mv="urn:schemas-microsoft-com:mac:vml" xmlns:c="http://schemas.openxmlformats.org/drawingml/2006/chart" xmlns:dgm="http://schemas.openxmlformats.org/drawingml/2006/diagram" xmlns:o="urn:schemas-microsoft-com:office:office" xmlns:v="urn:schemas-microsoft-com:vml" xmlns:pvml="urn:schemas-microsoft-com:office:powerpoint" xmlns:com="http://schemas.openxmlformats.org/drawingml/2006/compatibility" xmlns:p14="http://schemas.microsoft.com/office/powerpoint/2010/main" xmlns:p15="http://schemas.microsoft.com/office/powerpoint/2012/main" xmlns:go="http://customooxmlschemas.google.com/" r:id="rId10" roundtripDataSignature="AMtx7mjdo7FECp685JsX7/4pIVeoAktjNA=="/>
     </p:ext>
   </p:extLst>
 </p:presentation>
@@ -6141,7 +6141,7 @@
               <a:buNone/>
             </a:pPr>
             <a:r>
-              <a:rPr lang="en-AU" sz="2000">
+              <a:rPr lang="en-AU" sz="2000" dirty="0">
                 <a:solidFill>
                   <a:srgbClr val="29748D"/>
                 </a:solidFill>
@@ -6150,9 +6150,9 @@
                 <a:cs typeface="Quattrocento Sans"/>
                 <a:sym typeface="Quattrocento Sans"/>
               </a:rPr>
-              <a:t>Problem Statement Worksheet (Hypothesis Formation)</a:t>
-            </a:r>
-            <a:endParaRPr/>
+              <a:t>Problem Statement/ Introduction</a:t>
+            </a:r>
+            <a:endParaRPr dirty="0"/>
           </a:p>
         </p:txBody>
       </p:sp>
@@ -6342,7 +6342,7 @@
           <a:p>
             <a:pPr algn="ctr"/>
             <a:r>
-              <a:rPr lang="en-US" dirty="0"/>
+              <a:rPr lang="en-US" sz="2400" u="sng" dirty="0"/>
               <a:t>Recommendation Key Findings</a:t>
             </a:r>
           </a:p>
@@ -6363,7 +6363,7 @@
         <p:spPr>
           <a:xfrm>
             <a:off x="260891" y="756745"/>
-            <a:ext cx="8622215" cy="2308324"/>
+            <a:ext cx="8622215" cy="2800767"/>
           </a:xfrm>
           <a:prstGeom prst="rect">
             <a:avLst/>
@@ -6375,6 +6375,20 @@
             <a:spAutoFit/>
           </a:bodyPr>
           <a:lstStyle/>
+          <a:p>
+            <a:pPr marL="285750" indent="-285750">
+              <a:buFont typeface="Arial" panose="020B0604020202020204" pitchFamily="34" charset="0"/>
+              <a:buChar char="•"/>
+            </a:pPr>
+            <a:r>
+              <a:rPr lang="en-US" sz="1600" dirty="0"/>
+              <a:t>Lower Big Mountain Ski Resort weekend prices to $61.00.</a:t>
+            </a:r>
+            <a:br>
+              <a:rPr lang="en-US" sz="1600" dirty="0"/>
+            </a:br>
+            <a:endParaRPr lang="en-US" sz="1600" dirty="0"/>
+          </a:p>
           <a:p>
             <a:pPr marL="285750" indent="-285750">
               <a:buFont typeface="Arial" panose="020B0604020202020204" pitchFamily="34" charset="0"/>
@@ -6911,6 +6925,7 @@
           <a:bodyPr/>
           <a:lstStyle/>
           <a:p>
+            <a:pPr algn="ctr"/>
             <a:r>
               <a:rPr lang="en-US" dirty="0"/>
               <a:t>Multiple Regression Models were ran with different Parameters </a:t>
@@ -7174,8 +7189,9 @@
           <a:bodyPr/>
           <a:lstStyle/>
           <a:p>
-            <a:r>
-              <a:rPr lang="en-US" dirty="0"/>
+            <a:pPr algn="ctr"/>
+            <a:r>
+              <a:rPr lang="en-US" sz="2400" u="sng" dirty="0"/>
               <a:t>Final Model Selection</a:t>
             </a:r>
           </a:p>
@@ -7559,7 +7575,7 @@
         </p:blipFill>
         <p:spPr>
           <a:xfrm>
-            <a:off x="174942" y="3080091"/>
+            <a:off x="174942" y="2899368"/>
             <a:ext cx="4940300" cy="3314700"/>
           </a:xfrm>
           <a:prstGeom prst="rect">
@@ -7581,7 +7597,7 @@
         </p:nvSpPr>
         <p:spPr>
           <a:xfrm>
-            <a:off x="6117020" y="2395865"/>
+            <a:off x="6043450" y="2395865"/>
             <a:ext cx="2852035" cy="307777"/>
           </a:xfrm>
           <a:prstGeom prst="rect">
@@ -7604,10 +7620,10 @@
       </p:sp>
       <p:sp>
         <p:nvSpPr>
-          <p:cNvPr id="9" name="TextBox 8">
+          <p:cNvPr id="6" name="TextBox 5">
             <a:extLst>
               <a:ext uri="{FF2B5EF4-FFF2-40B4-BE49-F238E27FC236}">
-                <a16:creationId xmlns:a16="http://schemas.microsoft.com/office/drawing/2014/main" id="{682FF820-714D-D449-BCEF-424EBC03A988}"/>
+                <a16:creationId xmlns:a16="http://schemas.microsoft.com/office/drawing/2014/main" id="{C3216601-4094-D248-B8B6-1CD4BA48C825}"/>
               </a:ext>
             </a:extLst>
           </p:cNvPr>
@@ -7616,8 +7632,8 @@
         </p:nvSpPr>
         <p:spPr>
           <a:xfrm>
-            <a:off x="5896303" y="2826850"/>
-            <a:ext cx="3247697" cy="3970318"/>
+            <a:off x="700807" y="6204488"/>
+            <a:ext cx="5009700" cy="400110"/>
           </a:xfrm>
           <a:prstGeom prst="rect">
             <a:avLst/>
@@ -7630,120 +7646,1504 @@
           </a:bodyPr>
           <a:lstStyle/>
           <a:p>
-            <a:pPr marL="285750" indent="-285750">
-              <a:buFontTx/>
-              <a:buChar char="-"/>
-            </a:pPr>
-            <a:r>
-              <a:rPr lang="en-US" dirty="0"/>
-              <a:t>Adult Weekday Prices</a:t>
-            </a:r>
-          </a:p>
-          <a:p>
-            <a:pPr marL="285750" indent="-285750">
-              <a:buFontTx/>
-              <a:buChar char="-"/>
-            </a:pPr>
-            <a:r>
-              <a:rPr lang="en-US" dirty="0"/>
-              <a:t>Years open</a:t>
-            </a:r>
-          </a:p>
-          <a:p>
-            <a:pPr marL="285750" indent="-285750">
-              <a:buFontTx/>
-              <a:buChar char="-"/>
-            </a:pPr>
-            <a:r>
-              <a:rPr lang="en-US" dirty="0"/>
-              <a:t>Skiable square footage</a:t>
-            </a:r>
-          </a:p>
-          <a:p>
-            <a:pPr marL="285750" indent="-285750">
-              <a:buFontTx/>
-              <a:buChar char="-"/>
-            </a:pPr>
-            <a:r>
-              <a:rPr lang="en-US" dirty="0"/>
-              <a:t>runs</a:t>
-            </a:r>
-          </a:p>
-          <a:p>
-            <a:pPr marL="285750" indent="-285750">
-              <a:buFontTx/>
-              <a:buChar char="-"/>
-            </a:pPr>
-            <a:r>
-              <a:rPr lang="en-US" dirty="0"/>
-              <a:t>The number of regular one person chairlifts</a:t>
-            </a:r>
-          </a:p>
-          <a:p>
-            <a:pPr marL="285750" indent="-285750">
-              <a:buFontTx/>
-              <a:buChar char="-"/>
-            </a:pPr>
-            <a:r>
-              <a:rPr lang="en-US" dirty="0"/>
-              <a:t>The number of regular speed four person chairlifts</a:t>
-            </a:r>
-          </a:p>
-          <a:p>
-            <a:pPr marL="285750" indent="-285750">
-              <a:buFontTx/>
-              <a:buChar char="-"/>
-            </a:pPr>
-            <a:r>
-              <a:rPr lang="en-US" dirty="0"/>
-              <a:t>The number of fast speed four person chairlifts </a:t>
-            </a:r>
-          </a:p>
-          <a:p>
-            <a:pPr marL="285750" indent="-285750">
-              <a:buFontTx/>
-              <a:buChar char="-"/>
-            </a:pPr>
-            <a:r>
-              <a:rPr lang="en-US" dirty="0"/>
-              <a:t>The number of regular speed three  person chair life</a:t>
-            </a:r>
-          </a:p>
-          <a:p>
-            <a:pPr marL="285750" indent="-285750">
-              <a:buFontTx/>
-              <a:buChar char="-"/>
-            </a:pPr>
-            <a:r>
-              <a:rPr lang="en-US" dirty="0"/>
-              <a:t>The number of days open last year</a:t>
-            </a:r>
-          </a:p>
-          <a:p>
-            <a:pPr marL="285750" indent="-285750">
-              <a:buFontTx/>
-              <a:buChar char="-"/>
-            </a:pPr>
-            <a:r>
-              <a:rPr lang="en-US" dirty="0"/>
-              <a:t>Where the location of the mountain is</a:t>
-            </a:r>
-          </a:p>
-          <a:p>
-            <a:pPr marL="285750" indent="-285750">
-              <a:buFontTx/>
-              <a:buChar char="-"/>
-            </a:pPr>
-            <a:r>
-              <a:rPr lang="en-US" dirty="0"/>
-              <a:t>projected days open for the ski resort.  </a:t>
-            </a:r>
-          </a:p>
-          <a:p>
-            <a:endParaRPr lang="en-US" dirty="0"/>
+            <a:r>
+              <a:rPr lang="en-US" sz="1000" dirty="0"/>
+              <a:t>Orange dot:  Actual Big Mountain Price ($81.00)</a:t>
+            </a:r>
+          </a:p>
+          <a:p>
+            <a:r>
+              <a:rPr lang="en-US" sz="1000" dirty="0"/>
+              <a:t>Green dot: predicted Big Mountain Adult Weekend Price ($61.94)</a:t>
+            </a:r>
           </a:p>
         </p:txBody>
       </p:sp>
+      <p:graphicFrame>
+        <p:nvGraphicFramePr>
+          <p:cNvPr id="10" name="Table 9">
+            <a:extLst>
+              <a:ext uri="{FF2B5EF4-FFF2-40B4-BE49-F238E27FC236}">
+                <a16:creationId xmlns:a16="http://schemas.microsoft.com/office/drawing/2014/main" id="{B7BC6A50-B916-6840-BB37-17E0E42F80B4}"/>
+              </a:ext>
+            </a:extLst>
+          </p:cNvPr>
+          <p:cNvGraphicFramePr>
+            <a:graphicFrameLocks noGrp="1"/>
+          </p:cNvGraphicFramePr>
+          <p:nvPr>
+            <p:extLst>
+              <p:ext uri="{D42A27DB-BD31-4B8C-83A1-F6EECF244321}">
+                <p14:modId xmlns:p14="http://schemas.microsoft.com/office/powerpoint/2010/main" val="2792376319"/>
+              </p:ext>
+            </p:extLst>
+          </p:nvPr>
+        </p:nvGraphicFramePr>
+        <p:xfrm>
+          <a:off x="6043450" y="2826850"/>
+          <a:ext cx="2722180" cy="3318786"/>
+        </p:xfrm>
+        <a:graphic>
+          <a:graphicData uri="http://schemas.openxmlformats.org/drawingml/2006/table">
+            <a:tbl>
+              <a:tblPr/>
+              <a:tblGrid>
+                <a:gridCol w="1581859">
+                  <a:extLst>
+                    <a:ext uri="{9D8B030D-6E8A-4147-A177-3AD203B41FA5}">
+                      <a16:colId xmlns:a16="http://schemas.microsoft.com/office/drawing/2014/main" val="1995693269"/>
+                    </a:ext>
+                  </a:extLst>
+                </a:gridCol>
+                <a:gridCol w="1140321">
+                  <a:extLst>
+                    <a:ext uri="{9D8B030D-6E8A-4147-A177-3AD203B41FA5}">
+                      <a16:colId xmlns:a16="http://schemas.microsoft.com/office/drawing/2014/main" val="3510898192"/>
+                    </a:ext>
+                  </a:extLst>
+                </a:gridCol>
+              </a:tblGrid>
+              <a:tr h="254789">
+                <a:tc>
+                  <a:txBody>
+                    <a:bodyPr/>
+                    <a:lstStyle/>
+                    <a:p>
+                      <a:pPr algn="l" fontAlgn="b"/>
+                      <a:r>
+                        <a:rPr lang="en-US" sz="1400" b="1" i="0" u="none" strike="noStrike" dirty="0">
+                          <a:solidFill>
+                            <a:srgbClr val="FFFFFF"/>
+                          </a:solidFill>
+                          <a:effectLst/>
+                          <a:latin typeface="Calibri" panose="020F0502020204030204" pitchFamily="34" charset="0"/>
+                        </a:rPr>
+                        <a:t>Characteristics</a:t>
+                      </a:r>
+                    </a:p>
+                  </a:txBody>
+                  <a:tcPr marL="4534" marR="4534" marT="4534" marB="0" anchor="b">
+                    <a:lnL w="6350" cap="flat" cmpd="sng" algn="ctr">
+                      <a:solidFill>
+                        <a:srgbClr val="000000"/>
+                      </a:solidFill>
+                      <a:prstDash val="solid"/>
+                      <a:round/>
+                      <a:headEnd type="none" w="med" len="med"/>
+                      <a:tailEnd type="none" w="med" len="med"/>
+                    </a:lnL>
+                    <a:lnR>
+                      <a:noFill/>
+                    </a:lnR>
+                    <a:lnT w="6350" cap="flat" cmpd="sng" algn="ctr">
+                      <a:solidFill>
+                        <a:srgbClr val="000000"/>
+                      </a:solidFill>
+                      <a:prstDash val="solid"/>
+                      <a:round/>
+                      <a:headEnd type="none" w="med" len="med"/>
+                      <a:tailEnd type="none" w="med" len="med"/>
+                    </a:lnT>
+                    <a:lnB w="6350" cap="flat" cmpd="sng" algn="ctr">
+                      <a:solidFill>
+                        <a:srgbClr val="000000"/>
+                      </a:solidFill>
+                      <a:prstDash val="solid"/>
+                      <a:round/>
+                      <a:headEnd type="none" w="med" len="med"/>
+                      <a:tailEnd type="none" w="med" len="med"/>
+                    </a:lnB>
+                    <a:solidFill>
+                      <a:srgbClr val="000000"/>
+                    </a:solidFill>
+                  </a:tcPr>
+                </a:tc>
+                <a:tc>
+                  <a:txBody>
+                    <a:bodyPr/>
+                    <a:lstStyle/>
+                    <a:p>
+                      <a:pPr algn="l" fontAlgn="b"/>
+                      <a:r>
+                        <a:rPr lang="en-US" sz="1400" b="1" i="0" u="none" strike="noStrike">
+                          <a:solidFill>
+                            <a:srgbClr val="FFFFFF"/>
+                          </a:solidFill>
+                          <a:effectLst/>
+                          <a:latin typeface="Calibri" panose="020F0502020204030204" pitchFamily="34" charset="0"/>
+                        </a:rPr>
+                        <a:t>Coefficient</a:t>
+                      </a:r>
+                    </a:p>
+                  </a:txBody>
+                  <a:tcPr marL="4534" marR="4534" marT="4534" marB="0" anchor="b">
+                    <a:lnL>
+                      <a:noFill/>
+                    </a:lnL>
+                    <a:lnR w="6350" cap="flat" cmpd="sng" algn="ctr">
+                      <a:solidFill>
+                        <a:srgbClr val="000000"/>
+                      </a:solidFill>
+                      <a:prstDash val="solid"/>
+                      <a:round/>
+                      <a:headEnd type="none" w="med" len="med"/>
+                      <a:tailEnd type="none" w="med" len="med"/>
+                    </a:lnR>
+                    <a:lnT w="6350" cap="flat" cmpd="sng" algn="ctr">
+                      <a:solidFill>
+                        <a:srgbClr val="000000"/>
+                      </a:solidFill>
+                      <a:prstDash val="solid"/>
+                      <a:round/>
+                      <a:headEnd type="none" w="med" len="med"/>
+                      <a:tailEnd type="none" w="med" len="med"/>
+                    </a:lnT>
+                    <a:lnB w="6350" cap="flat" cmpd="sng" algn="ctr">
+                      <a:solidFill>
+                        <a:srgbClr val="000000"/>
+                      </a:solidFill>
+                      <a:prstDash val="solid"/>
+                      <a:round/>
+                      <a:headEnd type="none" w="med" len="med"/>
+                      <a:tailEnd type="none" w="med" len="med"/>
+                    </a:lnB>
+                    <a:solidFill>
+                      <a:srgbClr val="000000"/>
+                    </a:solidFill>
+                  </a:tcPr>
+                </a:tc>
+                <a:extLst>
+                  <a:ext uri="{0D108BD9-81ED-4DB2-BD59-A6C34878D82A}">
+                    <a16:rowId xmlns:a16="http://schemas.microsoft.com/office/drawing/2014/main" val="1142664618"/>
+                  </a:ext>
+                </a:extLst>
+              </a:tr>
+              <a:tr h="254789">
+                <a:tc>
+                  <a:txBody>
+                    <a:bodyPr/>
+                    <a:lstStyle/>
+                    <a:p>
+                      <a:pPr algn="l" fontAlgn="b"/>
+                      <a:r>
+                        <a:rPr lang="en-US" sz="1400" b="0" i="0" u="none" strike="noStrike" dirty="0" err="1">
+                          <a:solidFill>
+                            <a:srgbClr val="000000"/>
+                          </a:solidFill>
+                          <a:effectLst/>
+                          <a:latin typeface="Calibri" panose="020F0502020204030204" pitchFamily="34" charset="0"/>
+                        </a:rPr>
+                        <a:t>AdultWeekday</a:t>
+                      </a:r>
+                      <a:endParaRPr lang="en-US" sz="1400" b="0" i="0" u="none" strike="noStrike" dirty="0">
+                        <a:solidFill>
+                          <a:srgbClr val="000000"/>
+                        </a:solidFill>
+                        <a:effectLst/>
+                        <a:latin typeface="Calibri" panose="020F0502020204030204" pitchFamily="34" charset="0"/>
+                      </a:endParaRPr>
+                    </a:p>
+                  </a:txBody>
+                  <a:tcPr marL="4534" marR="4534" marT="4534" marB="0" anchor="b">
+                    <a:lnL w="6350" cap="flat" cmpd="sng" algn="ctr">
+                      <a:solidFill>
+                        <a:srgbClr val="000000"/>
+                      </a:solidFill>
+                      <a:prstDash val="solid"/>
+                      <a:round/>
+                      <a:headEnd type="none" w="med" len="med"/>
+                      <a:tailEnd type="none" w="med" len="med"/>
+                    </a:lnL>
+                    <a:lnR>
+                      <a:noFill/>
+                    </a:lnR>
+                    <a:lnT w="6350" cap="flat" cmpd="sng" algn="ctr">
+                      <a:solidFill>
+                        <a:srgbClr val="000000"/>
+                      </a:solidFill>
+                      <a:prstDash val="solid"/>
+                      <a:round/>
+                      <a:headEnd type="none" w="med" len="med"/>
+                      <a:tailEnd type="none" w="med" len="med"/>
+                    </a:lnT>
+                    <a:lnB w="6350" cap="flat" cmpd="sng" algn="ctr">
+                      <a:solidFill>
+                        <a:srgbClr val="000000"/>
+                      </a:solidFill>
+                      <a:prstDash val="solid"/>
+                      <a:round/>
+                      <a:headEnd type="none" w="med" len="med"/>
+                      <a:tailEnd type="none" w="med" len="med"/>
+                    </a:lnB>
+                  </a:tcPr>
+                </a:tc>
+                <a:tc>
+                  <a:txBody>
+                    <a:bodyPr/>
+                    <a:lstStyle/>
+                    <a:p>
+                      <a:pPr algn="r" fontAlgn="b"/>
+                      <a:r>
+                        <a:rPr lang="en-US" sz="1400" b="0" i="0" u="none" strike="noStrike">
+                          <a:solidFill>
+                            <a:srgbClr val="000000"/>
+                          </a:solidFill>
+                          <a:effectLst/>
+                          <a:latin typeface="Calibri" panose="020F0502020204030204" pitchFamily="34" charset="0"/>
+                        </a:rPr>
+                        <a:t>20.04566467</a:t>
+                      </a:r>
+                    </a:p>
+                  </a:txBody>
+                  <a:tcPr marL="4534" marR="4534" marT="4534" marB="0" anchor="b">
+                    <a:lnL>
+                      <a:noFill/>
+                    </a:lnL>
+                    <a:lnR w="6350" cap="flat" cmpd="sng" algn="ctr">
+                      <a:solidFill>
+                        <a:srgbClr val="000000"/>
+                      </a:solidFill>
+                      <a:prstDash val="solid"/>
+                      <a:round/>
+                      <a:headEnd type="none" w="med" len="med"/>
+                      <a:tailEnd type="none" w="med" len="med"/>
+                    </a:lnR>
+                    <a:lnT w="6350" cap="flat" cmpd="sng" algn="ctr">
+                      <a:solidFill>
+                        <a:srgbClr val="000000"/>
+                      </a:solidFill>
+                      <a:prstDash val="solid"/>
+                      <a:round/>
+                      <a:headEnd type="none" w="med" len="med"/>
+                      <a:tailEnd type="none" w="med" len="med"/>
+                    </a:lnT>
+                    <a:lnB w="6350" cap="flat" cmpd="sng" algn="ctr">
+                      <a:solidFill>
+                        <a:srgbClr val="000000"/>
+                      </a:solidFill>
+                      <a:prstDash val="solid"/>
+                      <a:round/>
+                      <a:headEnd type="none" w="med" len="med"/>
+                      <a:tailEnd type="none" w="med" len="med"/>
+                    </a:lnB>
+                  </a:tcPr>
+                </a:tc>
+                <a:extLst>
+                  <a:ext uri="{0D108BD9-81ED-4DB2-BD59-A6C34878D82A}">
+                    <a16:rowId xmlns:a16="http://schemas.microsoft.com/office/drawing/2014/main" val="957030044"/>
+                  </a:ext>
+                </a:extLst>
+              </a:tr>
+              <a:tr h="254789">
+                <a:tc>
+                  <a:txBody>
+                    <a:bodyPr/>
+                    <a:lstStyle/>
+                    <a:p>
+                      <a:pPr algn="l" fontAlgn="b"/>
+                      <a:r>
+                        <a:rPr lang="en-US" sz="1400" b="0" i="0" u="none" strike="noStrike">
+                          <a:solidFill>
+                            <a:srgbClr val="000000"/>
+                          </a:solidFill>
+                          <a:effectLst/>
+                          <a:latin typeface="Calibri" panose="020F0502020204030204" pitchFamily="34" charset="0"/>
+                        </a:rPr>
+                        <a:t>yearsOpen</a:t>
+                      </a:r>
+                    </a:p>
+                  </a:txBody>
+                  <a:tcPr marL="4534" marR="4534" marT="4534" marB="0" anchor="b">
+                    <a:lnL w="6350" cap="flat" cmpd="sng" algn="ctr">
+                      <a:solidFill>
+                        <a:srgbClr val="000000"/>
+                      </a:solidFill>
+                      <a:prstDash val="solid"/>
+                      <a:round/>
+                      <a:headEnd type="none" w="med" len="med"/>
+                      <a:tailEnd type="none" w="med" len="med"/>
+                    </a:lnL>
+                    <a:lnR>
+                      <a:noFill/>
+                    </a:lnR>
+                    <a:lnT w="6350" cap="flat" cmpd="sng" algn="ctr">
+                      <a:solidFill>
+                        <a:srgbClr val="000000"/>
+                      </a:solidFill>
+                      <a:prstDash val="solid"/>
+                      <a:round/>
+                      <a:headEnd type="none" w="med" len="med"/>
+                      <a:tailEnd type="none" w="med" len="med"/>
+                    </a:lnT>
+                    <a:lnB w="6350" cap="flat" cmpd="sng" algn="ctr">
+                      <a:solidFill>
+                        <a:srgbClr val="000000"/>
+                      </a:solidFill>
+                      <a:prstDash val="solid"/>
+                      <a:round/>
+                      <a:headEnd type="none" w="med" len="med"/>
+                      <a:tailEnd type="none" w="med" len="med"/>
+                    </a:lnB>
+                  </a:tcPr>
+                </a:tc>
+                <a:tc>
+                  <a:txBody>
+                    <a:bodyPr/>
+                    <a:lstStyle/>
+                    <a:p>
+                      <a:pPr algn="r" fontAlgn="b"/>
+                      <a:r>
+                        <a:rPr lang="en-US" sz="1400" b="0" i="0" u="none" strike="noStrike">
+                          <a:solidFill>
+                            <a:srgbClr val="000000"/>
+                          </a:solidFill>
+                          <a:effectLst/>
+                          <a:latin typeface="Calibri" panose="020F0502020204030204" pitchFamily="34" charset="0"/>
+                        </a:rPr>
+                        <a:t>2.866228369</a:t>
+                      </a:r>
+                    </a:p>
+                  </a:txBody>
+                  <a:tcPr marL="4534" marR="4534" marT="4534" marB="0" anchor="b">
+                    <a:lnL>
+                      <a:noFill/>
+                    </a:lnL>
+                    <a:lnR w="6350" cap="flat" cmpd="sng" algn="ctr">
+                      <a:solidFill>
+                        <a:srgbClr val="000000"/>
+                      </a:solidFill>
+                      <a:prstDash val="solid"/>
+                      <a:round/>
+                      <a:headEnd type="none" w="med" len="med"/>
+                      <a:tailEnd type="none" w="med" len="med"/>
+                    </a:lnR>
+                    <a:lnT w="6350" cap="flat" cmpd="sng" algn="ctr">
+                      <a:solidFill>
+                        <a:srgbClr val="000000"/>
+                      </a:solidFill>
+                      <a:prstDash val="solid"/>
+                      <a:round/>
+                      <a:headEnd type="none" w="med" len="med"/>
+                      <a:tailEnd type="none" w="med" len="med"/>
+                    </a:lnT>
+                    <a:lnB w="6350" cap="flat" cmpd="sng" algn="ctr">
+                      <a:solidFill>
+                        <a:srgbClr val="000000"/>
+                      </a:solidFill>
+                      <a:prstDash val="solid"/>
+                      <a:round/>
+                      <a:headEnd type="none" w="med" len="med"/>
+                      <a:tailEnd type="none" w="med" len="med"/>
+                    </a:lnB>
+                  </a:tcPr>
+                </a:tc>
+                <a:extLst>
+                  <a:ext uri="{0D108BD9-81ED-4DB2-BD59-A6C34878D82A}">
+                    <a16:rowId xmlns:a16="http://schemas.microsoft.com/office/drawing/2014/main" val="117406549"/>
+                  </a:ext>
+                </a:extLst>
+              </a:tr>
+              <a:tr h="254789">
+                <a:tc>
+                  <a:txBody>
+                    <a:bodyPr/>
+                    <a:lstStyle/>
+                    <a:p>
+                      <a:pPr algn="l" fontAlgn="b"/>
+                      <a:r>
+                        <a:rPr lang="en-US" sz="1400" b="0" i="0" u="none" strike="noStrike">
+                          <a:solidFill>
+                            <a:srgbClr val="000000"/>
+                          </a:solidFill>
+                          <a:effectLst/>
+                          <a:latin typeface="Calibri" panose="020F0502020204030204" pitchFamily="34" charset="0"/>
+                        </a:rPr>
+                        <a:t>SkiableTerrain_ac</a:t>
+                      </a:r>
+                    </a:p>
+                  </a:txBody>
+                  <a:tcPr marL="4534" marR="4534" marT="4534" marB="0" anchor="b">
+                    <a:lnL w="6350" cap="flat" cmpd="sng" algn="ctr">
+                      <a:solidFill>
+                        <a:srgbClr val="000000"/>
+                      </a:solidFill>
+                      <a:prstDash val="solid"/>
+                      <a:round/>
+                      <a:headEnd type="none" w="med" len="med"/>
+                      <a:tailEnd type="none" w="med" len="med"/>
+                    </a:lnL>
+                    <a:lnR>
+                      <a:noFill/>
+                    </a:lnR>
+                    <a:lnT w="6350" cap="flat" cmpd="sng" algn="ctr">
+                      <a:solidFill>
+                        <a:srgbClr val="000000"/>
+                      </a:solidFill>
+                      <a:prstDash val="solid"/>
+                      <a:round/>
+                      <a:headEnd type="none" w="med" len="med"/>
+                      <a:tailEnd type="none" w="med" len="med"/>
+                    </a:lnT>
+                    <a:lnB w="6350" cap="flat" cmpd="sng" algn="ctr">
+                      <a:solidFill>
+                        <a:srgbClr val="000000"/>
+                      </a:solidFill>
+                      <a:prstDash val="solid"/>
+                      <a:round/>
+                      <a:headEnd type="none" w="med" len="med"/>
+                      <a:tailEnd type="none" w="med" len="med"/>
+                    </a:lnB>
+                  </a:tcPr>
+                </a:tc>
+                <a:tc>
+                  <a:txBody>
+                    <a:bodyPr/>
+                    <a:lstStyle/>
+                    <a:p>
+                      <a:pPr algn="r" fontAlgn="b"/>
+                      <a:r>
+                        <a:rPr lang="en-US" sz="1400" b="0" i="0" u="none" strike="noStrike">
+                          <a:solidFill>
+                            <a:srgbClr val="000000"/>
+                          </a:solidFill>
+                          <a:effectLst/>
+                          <a:latin typeface="Calibri" panose="020F0502020204030204" pitchFamily="34" charset="0"/>
+                        </a:rPr>
+                        <a:t>2.408945198</a:t>
+                      </a:r>
+                    </a:p>
+                  </a:txBody>
+                  <a:tcPr marL="4534" marR="4534" marT="4534" marB="0" anchor="b">
+                    <a:lnL>
+                      <a:noFill/>
+                    </a:lnL>
+                    <a:lnR w="6350" cap="flat" cmpd="sng" algn="ctr">
+                      <a:solidFill>
+                        <a:srgbClr val="000000"/>
+                      </a:solidFill>
+                      <a:prstDash val="solid"/>
+                      <a:round/>
+                      <a:headEnd type="none" w="med" len="med"/>
+                      <a:tailEnd type="none" w="med" len="med"/>
+                    </a:lnR>
+                    <a:lnT w="6350" cap="flat" cmpd="sng" algn="ctr">
+                      <a:solidFill>
+                        <a:srgbClr val="000000"/>
+                      </a:solidFill>
+                      <a:prstDash val="solid"/>
+                      <a:round/>
+                      <a:headEnd type="none" w="med" len="med"/>
+                      <a:tailEnd type="none" w="med" len="med"/>
+                    </a:lnT>
+                    <a:lnB w="6350" cap="flat" cmpd="sng" algn="ctr">
+                      <a:solidFill>
+                        <a:srgbClr val="000000"/>
+                      </a:solidFill>
+                      <a:prstDash val="solid"/>
+                      <a:round/>
+                      <a:headEnd type="none" w="med" len="med"/>
+                      <a:tailEnd type="none" w="med" len="med"/>
+                    </a:lnB>
+                  </a:tcPr>
+                </a:tc>
+                <a:extLst>
+                  <a:ext uri="{0D108BD9-81ED-4DB2-BD59-A6C34878D82A}">
+                    <a16:rowId xmlns:a16="http://schemas.microsoft.com/office/drawing/2014/main" val="3024665425"/>
+                  </a:ext>
+                </a:extLst>
+              </a:tr>
+              <a:tr h="254789">
+                <a:tc>
+                  <a:txBody>
+                    <a:bodyPr/>
+                    <a:lstStyle/>
+                    <a:p>
+                      <a:pPr algn="l" fontAlgn="b"/>
+                      <a:r>
+                        <a:rPr lang="en-US" sz="1400" b="0" i="0" u="none" strike="noStrike">
+                          <a:solidFill>
+                            <a:srgbClr val="000000"/>
+                          </a:solidFill>
+                          <a:effectLst/>
+                          <a:latin typeface="Calibri" panose="020F0502020204030204" pitchFamily="34" charset="0"/>
+                        </a:rPr>
+                        <a:t>Runs</a:t>
+                      </a:r>
+                    </a:p>
+                  </a:txBody>
+                  <a:tcPr marL="4534" marR="4534" marT="4534" marB="0" anchor="b">
+                    <a:lnL w="6350" cap="flat" cmpd="sng" algn="ctr">
+                      <a:solidFill>
+                        <a:srgbClr val="000000"/>
+                      </a:solidFill>
+                      <a:prstDash val="solid"/>
+                      <a:round/>
+                      <a:headEnd type="none" w="med" len="med"/>
+                      <a:tailEnd type="none" w="med" len="med"/>
+                    </a:lnL>
+                    <a:lnR>
+                      <a:noFill/>
+                    </a:lnR>
+                    <a:lnT w="6350" cap="flat" cmpd="sng" algn="ctr">
+                      <a:solidFill>
+                        <a:srgbClr val="000000"/>
+                      </a:solidFill>
+                      <a:prstDash val="solid"/>
+                      <a:round/>
+                      <a:headEnd type="none" w="med" len="med"/>
+                      <a:tailEnd type="none" w="med" len="med"/>
+                    </a:lnT>
+                    <a:lnB w="6350" cap="flat" cmpd="sng" algn="ctr">
+                      <a:solidFill>
+                        <a:srgbClr val="000000"/>
+                      </a:solidFill>
+                      <a:prstDash val="solid"/>
+                      <a:round/>
+                      <a:headEnd type="none" w="med" len="med"/>
+                      <a:tailEnd type="none" w="med" len="med"/>
+                    </a:lnB>
+                  </a:tcPr>
+                </a:tc>
+                <a:tc>
+                  <a:txBody>
+                    <a:bodyPr/>
+                    <a:lstStyle/>
+                    <a:p>
+                      <a:pPr algn="r" fontAlgn="b"/>
+                      <a:r>
+                        <a:rPr lang="en-US" sz="1400" b="0" i="0" u="none" strike="noStrike">
+                          <a:solidFill>
+                            <a:srgbClr val="000000"/>
+                          </a:solidFill>
+                          <a:effectLst/>
+                          <a:latin typeface="Calibri" panose="020F0502020204030204" pitchFamily="34" charset="0"/>
+                        </a:rPr>
+                        <a:t>1.874827378</a:t>
+                      </a:r>
+                    </a:p>
+                  </a:txBody>
+                  <a:tcPr marL="4534" marR="4534" marT="4534" marB="0" anchor="b">
+                    <a:lnL>
+                      <a:noFill/>
+                    </a:lnL>
+                    <a:lnR w="6350" cap="flat" cmpd="sng" algn="ctr">
+                      <a:solidFill>
+                        <a:srgbClr val="000000"/>
+                      </a:solidFill>
+                      <a:prstDash val="solid"/>
+                      <a:round/>
+                      <a:headEnd type="none" w="med" len="med"/>
+                      <a:tailEnd type="none" w="med" len="med"/>
+                    </a:lnR>
+                    <a:lnT w="6350" cap="flat" cmpd="sng" algn="ctr">
+                      <a:solidFill>
+                        <a:srgbClr val="000000"/>
+                      </a:solidFill>
+                      <a:prstDash val="solid"/>
+                      <a:round/>
+                      <a:headEnd type="none" w="med" len="med"/>
+                      <a:tailEnd type="none" w="med" len="med"/>
+                    </a:lnT>
+                    <a:lnB w="6350" cap="flat" cmpd="sng" algn="ctr">
+                      <a:solidFill>
+                        <a:srgbClr val="000000"/>
+                      </a:solidFill>
+                      <a:prstDash val="solid"/>
+                      <a:round/>
+                      <a:headEnd type="none" w="med" len="med"/>
+                      <a:tailEnd type="none" w="med" len="med"/>
+                    </a:lnB>
+                  </a:tcPr>
+                </a:tc>
+                <a:extLst>
+                  <a:ext uri="{0D108BD9-81ED-4DB2-BD59-A6C34878D82A}">
+                    <a16:rowId xmlns:a16="http://schemas.microsoft.com/office/drawing/2014/main" val="757700960"/>
+                  </a:ext>
+                </a:extLst>
+              </a:tr>
+              <a:tr h="254789">
+                <a:tc>
+                  <a:txBody>
+                    <a:bodyPr/>
+                    <a:lstStyle/>
+                    <a:p>
+                      <a:pPr algn="l" fontAlgn="b"/>
+                      <a:r>
+                        <a:rPr lang="en-US" sz="1400" b="0" i="0" u="none" strike="noStrike">
+                          <a:solidFill>
+                            <a:srgbClr val="000000"/>
+                          </a:solidFill>
+                          <a:effectLst/>
+                          <a:latin typeface="Calibri" panose="020F0502020204030204" pitchFamily="34" charset="0"/>
+                        </a:rPr>
+                        <a:t>surface</a:t>
+                      </a:r>
+                    </a:p>
+                  </a:txBody>
+                  <a:tcPr marL="4534" marR="4534" marT="4534" marB="0" anchor="b">
+                    <a:lnL w="6350" cap="flat" cmpd="sng" algn="ctr">
+                      <a:solidFill>
+                        <a:srgbClr val="000000"/>
+                      </a:solidFill>
+                      <a:prstDash val="solid"/>
+                      <a:round/>
+                      <a:headEnd type="none" w="med" len="med"/>
+                      <a:tailEnd type="none" w="med" len="med"/>
+                    </a:lnL>
+                    <a:lnR>
+                      <a:noFill/>
+                    </a:lnR>
+                    <a:lnT w="6350" cap="flat" cmpd="sng" algn="ctr">
+                      <a:solidFill>
+                        <a:srgbClr val="000000"/>
+                      </a:solidFill>
+                      <a:prstDash val="solid"/>
+                      <a:round/>
+                      <a:headEnd type="none" w="med" len="med"/>
+                      <a:tailEnd type="none" w="med" len="med"/>
+                    </a:lnT>
+                    <a:lnB w="6350" cap="flat" cmpd="sng" algn="ctr">
+                      <a:solidFill>
+                        <a:srgbClr val="000000"/>
+                      </a:solidFill>
+                      <a:prstDash val="solid"/>
+                      <a:round/>
+                      <a:headEnd type="none" w="med" len="med"/>
+                      <a:tailEnd type="none" w="med" len="med"/>
+                    </a:lnB>
+                  </a:tcPr>
+                </a:tc>
+                <a:tc>
+                  <a:txBody>
+                    <a:bodyPr/>
+                    <a:lstStyle/>
+                    <a:p>
+                      <a:pPr algn="r" fontAlgn="b"/>
+                      <a:r>
+                        <a:rPr lang="en-US" sz="1400" b="0" i="0" u="none" strike="noStrike">
+                          <a:solidFill>
+                            <a:srgbClr val="000000"/>
+                          </a:solidFill>
+                          <a:effectLst/>
+                          <a:latin typeface="Calibri" panose="020F0502020204030204" pitchFamily="34" charset="0"/>
+                        </a:rPr>
+                        <a:t>1.642224503</a:t>
+                      </a:r>
+                    </a:p>
+                  </a:txBody>
+                  <a:tcPr marL="4534" marR="4534" marT="4534" marB="0" anchor="b">
+                    <a:lnL>
+                      <a:noFill/>
+                    </a:lnL>
+                    <a:lnR w="6350" cap="flat" cmpd="sng" algn="ctr">
+                      <a:solidFill>
+                        <a:srgbClr val="000000"/>
+                      </a:solidFill>
+                      <a:prstDash val="solid"/>
+                      <a:round/>
+                      <a:headEnd type="none" w="med" len="med"/>
+                      <a:tailEnd type="none" w="med" len="med"/>
+                    </a:lnR>
+                    <a:lnT w="6350" cap="flat" cmpd="sng" algn="ctr">
+                      <a:solidFill>
+                        <a:srgbClr val="000000"/>
+                      </a:solidFill>
+                      <a:prstDash val="solid"/>
+                      <a:round/>
+                      <a:headEnd type="none" w="med" len="med"/>
+                      <a:tailEnd type="none" w="med" len="med"/>
+                    </a:lnT>
+                    <a:lnB w="6350" cap="flat" cmpd="sng" algn="ctr">
+                      <a:solidFill>
+                        <a:srgbClr val="000000"/>
+                      </a:solidFill>
+                      <a:prstDash val="solid"/>
+                      <a:round/>
+                      <a:headEnd type="none" w="med" len="med"/>
+                      <a:tailEnd type="none" w="med" len="med"/>
+                    </a:lnB>
+                  </a:tcPr>
+                </a:tc>
+                <a:extLst>
+                  <a:ext uri="{0D108BD9-81ED-4DB2-BD59-A6C34878D82A}">
+                    <a16:rowId xmlns:a16="http://schemas.microsoft.com/office/drawing/2014/main" val="1437973641"/>
+                  </a:ext>
+                </a:extLst>
+              </a:tr>
+              <a:tr h="254789">
+                <a:tc>
+                  <a:txBody>
+                    <a:bodyPr/>
+                    <a:lstStyle/>
+                    <a:p>
+                      <a:pPr algn="l" fontAlgn="b"/>
+                      <a:r>
+                        <a:rPr lang="en-US" sz="1400" b="0" i="0" u="none" strike="noStrike">
+                          <a:solidFill>
+                            <a:srgbClr val="000000"/>
+                          </a:solidFill>
+                          <a:effectLst/>
+                          <a:latin typeface="Calibri" panose="020F0502020204030204" pitchFamily="34" charset="0"/>
+                        </a:rPr>
+                        <a:t>quad</a:t>
+                      </a:r>
+                    </a:p>
+                  </a:txBody>
+                  <a:tcPr marL="4534" marR="4534" marT="4534" marB="0" anchor="b">
+                    <a:lnL w="6350" cap="flat" cmpd="sng" algn="ctr">
+                      <a:solidFill>
+                        <a:srgbClr val="000000"/>
+                      </a:solidFill>
+                      <a:prstDash val="solid"/>
+                      <a:round/>
+                      <a:headEnd type="none" w="med" len="med"/>
+                      <a:tailEnd type="none" w="med" len="med"/>
+                    </a:lnL>
+                    <a:lnR>
+                      <a:noFill/>
+                    </a:lnR>
+                    <a:lnT w="6350" cap="flat" cmpd="sng" algn="ctr">
+                      <a:solidFill>
+                        <a:srgbClr val="000000"/>
+                      </a:solidFill>
+                      <a:prstDash val="solid"/>
+                      <a:round/>
+                      <a:headEnd type="none" w="med" len="med"/>
+                      <a:tailEnd type="none" w="med" len="med"/>
+                    </a:lnT>
+                    <a:lnB w="6350" cap="flat" cmpd="sng" algn="ctr">
+                      <a:solidFill>
+                        <a:srgbClr val="000000"/>
+                      </a:solidFill>
+                      <a:prstDash val="solid"/>
+                      <a:round/>
+                      <a:headEnd type="none" w="med" len="med"/>
+                      <a:tailEnd type="none" w="med" len="med"/>
+                    </a:lnB>
+                  </a:tcPr>
+                </a:tc>
+                <a:tc>
+                  <a:txBody>
+                    <a:bodyPr/>
+                    <a:lstStyle/>
+                    <a:p>
+                      <a:pPr algn="r" fontAlgn="b"/>
+                      <a:r>
+                        <a:rPr lang="en-US" sz="1400" b="0" i="0" u="none" strike="noStrike">
+                          <a:solidFill>
+                            <a:srgbClr val="000000"/>
+                          </a:solidFill>
+                          <a:effectLst/>
+                          <a:latin typeface="Calibri" panose="020F0502020204030204" pitchFamily="34" charset="0"/>
+                        </a:rPr>
+                        <a:t>1.467047558</a:t>
+                      </a:r>
+                    </a:p>
+                  </a:txBody>
+                  <a:tcPr marL="4534" marR="4534" marT="4534" marB="0" anchor="b">
+                    <a:lnL>
+                      <a:noFill/>
+                    </a:lnL>
+                    <a:lnR w="6350" cap="flat" cmpd="sng" algn="ctr">
+                      <a:solidFill>
+                        <a:srgbClr val="000000"/>
+                      </a:solidFill>
+                      <a:prstDash val="solid"/>
+                      <a:round/>
+                      <a:headEnd type="none" w="med" len="med"/>
+                      <a:tailEnd type="none" w="med" len="med"/>
+                    </a:lnR>
+                    <a:lnT w="6350" cap="flat" cmpd="sng" algn="ctr">
+                      <a:solidFill>
+                        <a:srgbClr val="000000"/>
+                      </a:solidFill>
+                      <a:prstDash val="solid"/>
+                      <a:round/>
+                      <a:headEnd type="none" w="med" len="med"/>
+                      <a:tailEnd type="none" w="med" len="med"/>
+                    </a:lnT>
+                    <a:lnB w="6350" cap="flat" cmpd="sng" algn="ctr">
+                      <a:solidFill>
+                        <a:srgbClr val="000000"/>
+                      </a:solidFill>
+                      <a:prstDash val="solid"/>
+                      <a:round/>
+                      <a:headEnd type="none" w="med" len="med"/>
+                      <a:tailEnd type="none" w="med" len="med"/>
+                    </a:lnB>
+                  </a:tcPr>
+                </a:tc>
+                <a:extLst>
+                  <a:ext uri="{0D108BD9-81ED-4DB2-BD59-A6C34878D82A}">
+                    <a16:rowId xmlns:a16="http://schemas.microsoft.com/office/drawing/2014/main" val="3783953965"/>
+                  </a:ext>
+                </a:extLst>
+              </a:tr>
+              <a:tr h="254789">
+                <a:tc>
+                  <a:txBody>
+                    <a:bodyPr/>
+                    <a:lstStyle/>
+                    <a:p>
+                      <a:pPr algn="l" fontAlgn="b"/>
+                      <a:r>
+                        <a:rPr lang="en-US" sz="1400" b="0" i="0" u="none" strike="noStrike">
+                          <a:solidFill>
+                            <a:srgbClr val="000000"/>
+                          </a:solidFill>
+                          <a:effectLst/>
+                          <a:latin typeface="Calibri" panose="020F0502020204030204" pitchFamily="34" charset="0"/>
+                        </a:rPr>
+                        <a:t>fastQuads</a:t>
+                      </a:r>
+                    </a:p>
+                  </a:txBody>
+                  <a:tcPr marL="4534" marR="4534" marT="4534" marB="0" anchor="b">
+                    <a:lnL w="6350" cap="flat" cmpd="sng" algn="ctr">
+                      <a:solidFill>
+                        <a:srgbClr val="000000"/>
+                      </a:solidFill>
+                      <a:prstDash val="solid"/>
+                      <a:round/>
+                      <a:headEnd type="none" w="med" len="med"/>
+                      <a:tailEnd type="none" w="med" len="med"/>
+                    </a:lnL>
+                    <a:lnR>
+                      <a:noFill/>
+                    </a:lnR>
+                    <a:lnT w="6350" cap="flat" cmpd="sng" algn="ctr">
+                      <a:solidFill>
+                        <a:srgbClr val="000000"/>
+                      </a:solidFill>
+                      <a:prstDash val="solid"/>
+                      <a:round/>
+                      <a:headEnd type="none" w="med" len="med"/>
+                      <a:tailEnd type="none" w="med" len="med"/>
+                    </a:lnT>
+                    <a:lnB w="6350" cap="flat" cmpd="sng" algn="ctr">
+                      <a:solidFill>
+                        <a:srgbClr val="000000"/>
+                      </a:solidFill>
+                      <a:prstDash val="solid"/>
+                      <a:round/>
+                      <a:headEnd type="none" w="med" len="med"/>
+                      <a:tailEnd type="none" w="med" len="med"/>
+                    </a:lnB>
+                  </a:tcPr>
+                </a:tc>
+                <a:tc>
+                  <a:txBody>
+                    <a:bodyPr/>
+                    <a:lstStyle/>
+                    <a:p>
+                      <a:pPr algn="r" fontAlgn="b"/>
+                      <a:r>
+                        <a:rPr lang="en-US" sz="1400" b="0" i="0" u="none" strike="noStrike">
+                          <a:solidFill>
+                            <a:srgbClr val="000000"/>
+                          </a:solidFill>
+                          <a:effectLst/>
+                          <a:latin typeface="Calibri" panose="020F0502020204030204" pitchFamily="34" charset="0"/>
+                        </a:rPr>
+                        <a:t>1.383104962</a:t>
+                      </a:r>
+                    </a:p>
+                  </a:txBody>
+                  <a:tcPr marL="4534" marR="4534" marT="4534" marB="0" anchor="b">
+                    <a:lnL>
+                      <a:noFill/>
+                    </a:lnL>
+                    <a:lnR w="6350" cap="flat" cmpd="sng" algn="ctr">
+                      <a:solidFill>
+                        <a:srgbClr val="000000"/>
+                      </a:solidFill>
+                      <a:prstDash val="solid"/>
+                      <a:round/>
+                      <a:headEnd type="none" w="med" len="med"/>
+                      <a:tailEnd type="none" w="med" len="med"/>
+                    </a:lnR>
+                    <a:lnT w="6350" cap="flat" cmpd="sng" algn="ctr">
+                      <a:solidFill>
+                        <a:srgbClr val="000000"/>
+                      </a:solidFill>
+                      <a:prstDash val="solid"/>
+                      <a:round/>
+                      <a:headEnd type="none" w="med" len="med"/>
+                      <a:tailEnd type="none" w="med" len="med"/>
+                    </a:lnT>
+                    <a:lnB w="6350" cap="flat" cmpd="sng" algn="ctr">
+                      <a:solidFill>
+                        <a:srgbClr val="000000"/>
+                      </a:solidFill>
+                      <a:prstDash val="solid"/>
+                      <a:round/>
+                      <a:headEnd type="none" w="med" len="med"/>
+                      <a:tailEnd type="none" w="med" len="med"/>
+                    </a:lnB>
+                  </a:tcPr>
+                </a:tc>
+                <a:extLst>
+                  <a:ext uri="{0D108BD9-81ED-4DB2-BD59-A6C34878D82A}">
+                    <a16:rowId xmlns:a16="http://schemas.microsoft.com/office/drawing/2014/main" val="458075035"/>
+                  </a:ext>
+                </a:extLst>
+              </a:tr>
+              <a:tr h="254789">
+                <a:tc>
+                  <a:txBody>
+                    <a:bodyPr/>
+                    <a:lstStyle/>
+                    <a:p>
+                      <a:pPr algn="l" fontAlgn="b"/>
+                      <a:r>
+                        <a:rPr lang="en-US" sz="1400" b="0" i="0" u="none" strike="noStrike">
+                          <a:solidFill>
+                            <a:srgbClr val="000000"/>
+                          </a:solidFill>
+                          <a:effectLst/>
+                          <a:latin typeface="Calibri" panose="020F0502020204030204" pitchFamily="34" charset="0"/>
+                        </a:rPr>
+                        <a:t>triple</a:t>
+                      </a:r>
+                    </a:p>
+                  </a:txBody>
+                  <a:tcPr marL="4534" marR="4534" marT="4534" marB="0" anchor="b">
+                    <a:lnL w="6350" cap="flat" cmpd="sng" algn="ctr">
+                      <a:solidFill>
+                        <a:srgbClr val="000000"/>
+                      </a:solidFill>
+                      <a:prstDash val="solid"/>
+                      <a:round/>
+                      <a:headEnd type="none" w="med" len="med"/>
+                      <a:tailEnd type="none" w="med" len="med"/>
+                    </a:lnL>
+                    <a:lnR>
+                      <a:noFill/>
+                    </a:lnR>
+                    <a:lnT w="6350" cap="flat" cmpd="sng" algn="ctr">
+                      <a:solidFill>
+                        <a:srgbClr val="000000"/>
+                      </a:solidFill>
+                      <a:prstDash val="solid"/>
+                      <a:round/>
+                      <a:headEnd type="none" w="med" len="med"/>
+                      <a:tailEnd type="none" w="med" len="med"/>
+                    </a:lnT>
+                    <a:lnB w="6350" cap="flat" cmpd="sng" algn="ctr">
+                      <a:solidFill>
+                        <a:srgbClr val="000000"/>
+                      </a:solidFill>
+                      <a:prstDash val="solid"/>
+                      <a:round/>
+                      <a:headEnd type="none" w="med" len="med"/>
+                      <a:tailEnd type="none" w="med" len="med"/>
+                    </a:lnB>
+                  </a:tcPr>
+                </a:tc>
+                <a:tc>
+                  <a:txBody>
+                    <a:bodyPr/>
+                    <a:lstStyle/>
+                    <a:p>
+                      <a:pPr algn="r" fontAlgn="b"/>
+                      <a:r>
+                        <a:rPr lang="en-US" sz="1400" b="0" i="0" u="none" strike="noStrike">
+                          <a:solidFill>
+                            <a:srgbClr val="000000"/>
+                          </a:solidFill>
+                          <a:effectLst/>
+                          <a:latin typeface="Calibri" panose="020F0502020204030204" pitchFamily="34" charset="0"/>
+                        </a:rPr>
+                        <a:t>1.246224275</a:t>
+                      </a:r>
+                    </a:p>
+                  </a:txBody>
+                  <a:tcPr marL="4534" marR="4534" marT="4534" marB="0" anchor="b">
+                    <a:lnL>
+                      <a:noFill/>
+                    </a:lnL>
+                    <a:lnR w="6350" cap="flat" cmpd="sng" algn="ctr">
+                      <a:solidFill>
+                        <a:srgbClr val="000000"/>
+                      </a:solidFill>
+                      <a:prstDash val="solid"/>
+                      <a:round/>
+                      <a:headEnd type="none" w="med" len="med"/>
+                      <a:tailEnd type="none" w="med" len="med"/>
+                    </a:lnR>
+                    <a:lnT w="6350" cap="flat" cmpd="sng" algn="ctr">
+                      <a:solidFill>
+                        <a:srgbClr val="000000"/>
+                      </a:solidFill>
+                      <a:prstDash val="solid"/>
+                      <a:round/>
+                      <a:headEnd type="none" w="med" len="med"/>
+                      <a:tailEnd type="none" w="med" len="med"/>
+                    </a:lnT>
+                    <a:lnB w="6350" cap="flat" cmpd="sng" algn="ctr">
+                      <a:solidFill>
+                        <a:srgbClr val="000000"/>
+                      </a:solidFill>
+                      <a:prstDash val="solid"/>
+                      <a:round/>
+                      <a:headEnd type="none" w="med" len="med"/>
+                      <a:tailEnd type="none" w="med" len="med"/>
+                    </a:lnB>
+                  </a:tcPr>
+                </a:tc>
+                <a:extLst>
+                  <a:ext uri="{0D108BD9-81ED-4DB2-BD59-A6C34878D82A}">
+                    <a16:rowId xmlns:a16="http://schemas.microsoft.com/office/drawing/2014/main" val="2311201059"/>
+                  </a:ext>
+                </a:extLst>
+              </a:tr>
+              <a:tr h="254789">
+                <a:tc>
+                  <a:txBody>
+                    <a:bodyPr/>
+                    <a:lstStyle/>
+                    <a:p>
+                      <a:pPr algn="l" fontAlgn="b"/>
+                      <a:r>
+                        <a:rPr lang="en-US" sz="1400" b="0" i="0" u="none" strike="noStrike">
+                          <a:solidFill>
+                            <a:srgbClr val="000000"/>
+                          </a:solidFill>
+                          <a:effectLst/>
+                          <a:latin typeface="Calibri" panose="020F0502020204030204" pitchFamily="34" charset="0"/>
+                        </a:rPr>
+                        <a:t>daysOpenLastYear</a:t>
+                      </a:r>
+                    </a:p>
+                  </a:txBody>
+                  <a:tcPr marL="4534" marR="4534" marT="4534" marB="0" anchor="b">
+                    <a:lnL w="6350" cap="flat" cmpd="sng" algn="ctr">
+                      <a:solidFill>
+                        <a:srgbClr val="000000"/>
+                      </a:solidFill>
+                      <a:prstDash val="solid"/>
+                      <a:round/>
+                      <a:headEnd type="none" w="med" len="med"/>
+                      <a:tailEnd type="none" w="med" len="med"/>
+                    </a:lnL>
+                    <a:lnR>
+                      <a:noFill/>
+                    </a:lnR>
+                    <a:lnT w="6350" cap="flat" cmpd="sng" algn="ctr">
+                      <a:solidFill>
+                        <a:srgbClr val="000000"/>
+                      </a:solidFill>
+                      <a:prstDash val="solid"/>
+                      <a:round/>
+                      <a:headEnd type="none" w="med" len="med"/>
+                      <a:tailEnd type="none" w="med" len="med"/>
+                    </a:lnT>
+                    <a:lnB w="6350" cap="flat" cmpd="sng" algn="ctr">
+                      <a:solidFill>
+                        <a:srgbClr val="000000"/>
+                      </a:solidFill>
+                      <a:prstDash val="solid"/>
+                      <a:round/>
+                      <a:headEnd type="none" w="med" len="med"/>
+                      <a:tailEnd type="none" w="med" len="med"/>
+                    </a:lnB>
+                  </a:tcPr>
+                </a:tc>
+                <a:tc>
+                  <a:txBody>
+                    <a:bodyPr/>
+                    <a:lstStyle/>
+                    <a:p>
+                      <a:pPr algn="r" fontAlgn="b"/>
+                      <a:r>
+                        <a:rPr lang="en-US" sz="1400" b="0" i="0" u="none" strike="noStrike" dirty="0">
+                          <a:solidFill>
+                            <a:srgbClr val="000000"/>
+                          </a:solidFill>
+                          <a:effectLst/>
+                          <a:latin typeface="Calibri" panose="020F0502020204030204" pitchFamily="34" charset="0"/>
+                        </a:rPr>
+                        <a:t>1.2103603</a:t>
+                      </a:r>
+                    </a:p>
+                  </a:txBody>
+                  <a:tcPr marL="4534" marR="4534" marT="4534" marB="0" anchor="b">
+                    <a:lnL>
+                      <a:noFill/>
+                    </a:lnL>
+                    <a:lnR w="6350" cap="flat" cmpd="sng" algn="ctr">
+                      <a:solidFill>
+                        <a:srgbClr val="000000"/>
+                      </a:solidFill>
+                      <a:prstDash val="solid"/>
+                      <a:round/>
+                      <a:headEnd type="none" w="med" len="med"/>
+                      <a:tailEnd type="none" w="med" len="med"/>
+                    </a:lnR>
+                    <a:lnT w="6350" cap="flat" cmpd="sng" algn="ctr">
+                      <a:solidFill>
+                        <a:srgbClr val="000000"/>
+                      </a:solidFill>
+                      <a:prstDash val="solid"/>
+                      <a:round/>
+                      <a:headEnd type="none" w="med" len="med"/>
+                      <a:tailEnd type="none" w="med" len="med"/>
+                    </a:lnT>
+                    <a:lnB w="6350" cap="flat" cmpd="sng" algn="ctr">
+                      <a:solidFill>
+                        <a:srgbClr val="000000"/>
+                      </a:solidFill>
+                      <a:prstDash val="solid"/>
+                      <a:round/>
+                      <a:headEnd type="none" w="med" len="med"/>
+                      <a:tailEnd type="none" w="med" len="med"/>
+                    </a:lnB>
+                  </a:tcPr>
+                </a:tc>
+                <a:extLst>
+                  <a:ext uri="{0D108BD9-81ED-4DB2-BD59-A6C34878D82A}">
+                    <a16:rowId xmlns:a16="http://schemas.microsoft.com/office/drawing/2014/main" val="1070989088"/>
+                  </a:ext>
+                </a:extLst>
+              </a:tr>
+              <a:tr h="254789">
+                <a:tc>
+                  <a:txBody>
+                    <a:bodyPr/>
+                    <a:lstStyle/>
+                    <a:p>
+                      <a:pPr algn="l" fontAlgn="b"/>
+                      <a:r>
+                        <a:rPr lang="en-US" sz="1400" b="0" i="0" u="none" strike="noStrike">
+                          <a:solidFill>
+                            <a:srgbClr val="000000"/>
+                          </a:solidFill>
+                          <a:effectLst/>
+                          <a:latin typeface="Calibri" panose="020F0502020204030204" pitchFamily="34" charset="0"/>
+                        </a:rPr>
+                        <a:t>vertical_drop</a:t>
+                      </a:r>
+                    </a:p>
+                  </a:txBody>
+                  <a:tcPr marL="4534" marR="4534" marT="4534" marB="0" anchor="b">
+                    <a:lnL w="6350" cap="flat" cmpd="sng" algn="ctr">
+                      <a:solidFill>
+                        <a:srgbClr val="000000"/>
+                      </a:solidFill>
+                      <a:prstDash val="solid"/>
+                      <a:round/>
+                      <a:headEnd type="none" w="med" len="med"/>
+                      <a:tailEnd type="none" w="med" len="med"/>
+                    </a:lnL>
+                    <a:lnR>
+                      <a:noFill/>
+                    </a:lnR>
+                    <a:lnT w="6350" cap="flat" cmpd="sng" algn="ctr">
+                      <a:solidFill>
+                        <a:srgbClr val="000000"/>
+                      </a:solidFill>
+                      <a:prstDash val="solid"/>
+                      <a:round/>
+                      <a:headEnd type="none" w="med" len="med"/>
+                      <a:tailEnd type="none" w="med" len="med"/>
+                    </a:lnT>
+                    <a:lnB w="6350" cap="flat" cmpd="sng" algn="ctr">
+                      <a:solidFill>
+                        <a:srgbClr val="000000"/>
+                      </a:solidFill>
+                      <a:prstDash val="solid"/>
+                      <a:round/>
+                      <a:headEnd type="none" w="med" len="med"/>
+                      <a:tailEnd type="none" w="med" len="med"/>
+                    </a:lnB>
+                  </a:tcPr>
+                </a:tc>
+                <a:tc>
+                  <a:txBody>
+                    <a:bodyPr/>
+                    <a:lstStyle/>
+                    <a:p>
+                      <a:pPr algn="r" fontAlgn="b"/>
+                      <a:r>
+                        <a:rPr lang="en-US" sz="1400" b="0" i="0" u="none" strike="noStrike">
+                          <a:solidFill>
+                            <a:srgbClr val="000000"/>
+                          </a:solidFill>
+                          <a:effectLst/>
+                          <a:latin typeface="Calibri" panose="020F0502020204030204" pitchFamily="34" charset="0"/>
+                        </a:rPr>
+                        <a:t>1.175017773</a:t>
+                      </a:r>
+                    </a:p>
+                  </a:txBody>
+                  <a:tcPr marL="4534" marR="4534" marT="4534" marB="0" anchor="b">
+                    <a:lnL>
+                      <a:noFill/>
+                    </a:lnL>
+                    <a:lnR w="6350" cap="flat" cmpd="sng" algn="ctr">
+                      <a:solidFill>
+                        <a:srgbClr val="000000"/>
+                      </a:solidFill>
+                      <a:prstDash val="solid"/>
+                      <a:round/>
+                      <a:headEnd type="none" w="med" len="med"/>
+                      <a:tailEnd type="none" w="med" len="med"/>
+                    </a:lnR>
+                    <a:lnT w="6350" cap="flat" cmpd="sng" algn="ctr">
+                      <a:solidFill>
+                        <a:srgbClr val="000000"/>
+                      </a:solidFill>
+                      <a:prstDash val="solid"/>
+                      <a:round/>
+                      <a:headEnd type="none" w="med" len="med"/>
+                      <a:tailEnd type="none" w="med" len="med"/>
+                    </a:lnT>
+                    <a:lnB w="6350" cap="flat" cmpd="sng" algn="ctr">
+                      <a:solidFill>
+                        <a:srgbClr val="000000"/>
+                      </a:solidFill>
+                      <a:prstDash val="solid"/>
+                      <a:round/>
+                      <a:headEnd type="none" w="med" len="med"/>
+                      <a:tailEnd type="none" w="med" len="med"/>
+                    </a:lnB>
+                  </a:tcPr>
+                </a:tc>
+                <a:extLst>
+                  <a:ext uri="{0D108BD9-81ED-4DB2-BD59-A6C34878D82A}">
+                    <a16:rowId xmlns:a16="http://schemas.microsoft.com/office/drawing/2014/main" val="2312288484"/>
+                  </a:ext>
+                </a:extLst>
+              </a:tr>
+              <a:tr h="254789">
+                <a:tc>
+                  <a:txBody>
+                    <a:bodyPr/>
+                    <a:lstStyle/>
+                    <a:p>
+                      <a:pPr algn="l" fontAlgn="b"/>
+                      <a:r>
+                        <a:rPr lang="en-US" sz="1400" b="0" i="0" u="none" strike="noStrike">
+                          <a:solidFill>
+                            <a:srgbClr val="000000"/>
+                          </a:solidFill>
+                          <a:effectLst/>
+                          <a:latin typeface="Calibri" panose="020F0502020204030204" pitchFamily="34" charset="0"/>
+                        </a:rPr>
+                        <a:t>summit_elev</a:t>
+                      </a:r>
+                    </a:p>
+                  </a:txBody>
+                  <a:tcPr marL="4534" marR="4534" marT="4534" marB="0" anchor="b">
+                    <a:lnL w="6350" cap="flat" cmpd="sng" algn="ctr">
+                      <a:solidFill>
+                        <a:srgbClr val="000000"/>
+                      </a:solidFill>
+                      <a:prstDash val="solid"/>
+                      <a:round/>
+                      <a:headEnd type="none" w="med" len="med"/>
+                      <a:tailEnd type="none" w="med" len="med"/>
+                    </a:lnL>
+                    <a:lnR>
+                      <a:noFill/>
+                    </a:lnR>
+                    <a:lnT w="6350" cap="flat" cmpd="sng" algn="ctr">
+                      <a:solidFill>
+                        <a:srgbClr val="000000"/>
+                      </a:solidFill>
+                      <a:prstDash val="solid"/>
+                      <a:round/>
+                      <a:headEnd type="none" w="med" len="med"/>
+                      <a:tailEnd type="none" w="med" len="med"/>
+                    </a:lnT>
+                    <a:lnB w="6350" cap="flat" cmpd="sng" algn="ctr">
+                      <a:solidFill>
+                        <a:srgbClr val="000000"/>
+                      </a:solidFill>
+                      <a:prstDash val="solid"/>
+                      <a:round/>
+                      <a:headEnd type="none" w="med" len="med"/>
+                      <a:tailEnd type="none" w="med" len="med"/>
+                    </a:lnB>
+                  </a:tcPr>
+                </a:tc>
+                <a:tc>
+                  <a:txBody>
+                    <a:bodyPr/>
+                    <a:lstStyle/>
+                    <a:p>
+                      <a:pPr algn="r" fontAlgn="b"/>
+                      <a:r>
+                        <a:rPr lang="en-US" sz="1400" b="0" i="0" u="none" strike="noStrike">
+                          <a:solidFill>
+                            <a:srgbClr val="000000"/>
+                          </a:solidFill>
+                          <a:effectLst/>
+                          <a:latin typeface="Calibri" panose="020F0502020204030204" pitchFamily="34" charset="0"/>
+                        </a:rPr>
+                        <a:t>1.114987306</a:t>
+                      </a:r>
+                    </a:p>
+                  </a:txBody>
+                  <a:tcPr marL="4534" marR="4534" marT="4534" marB="0" anchor="b">
+                    <a:lnL>
+                      <a:noFill/>
+                    </a:lnL>
+                    <a:lnR w="6350" cap="flat" cmpd="sng" algn="ctr">
+                      <a:solidFill>
+                        <a:srgbClr val="000000"/>
+                      </a:solidFill>
+                      <a:prstDash val="solid"/>
+                      <a:round/>
+                      <a:headEnd type="none" w="med" len="med"/>
+                      <a:tailEnd type="none" w="med" len="med"/>
+                    </a:lnR>
+                    <a:lnT w="6350" cap="flat" cmpd="sng" algn="ctr">
+                      <a:solidFill>
+                        <a:srgbClr val="000000"/>
+                      </a:solidFill>
+                      <a:prstDash val="solid"/>
+                      <a:round/>
+                      <a:headEnd type="none" w="med" len="med"/>
+                      <a:tailEnd type="none" w="med" len="med"/>
+                    </a:lnT>
+                    <a:lnB w="6350" cap="flat" cmpd="sng" algn="ctr">
+                      <a:solidFill>
+                        <a:srgbClr val="000000"/>
+                      </a:solidFill>
+                      <a:prstDash val="solid"/>
+                      <a:round/>
+                      <a:headEnd type="none" w="med" len="med"/>
+                      <a:tailEnd type="none" w="med" len="med"/>
+                    </a:lnB>
+                  </a:tcPr>
+                </a:tc>
+                <a:extLst>
+                  <a:ext uri="{0D108BD9-81ED-4DB2-BD59-A6C34878D82A}">
+                    <a16:rowId xmlns:a16="http://schemas.microsoft.com/office/drawing/2014/main" val="3913415504"/>
+                  </a:ext>
+                </a:extLst>
+              </a:tr>
+              <a:tr h="261318">
+                <a:tc>
+                  <a:txBody>
+                    <a:bodyPr/>
+                    <a:lstStyle/>
+                    <a:p>
+                      <a:pPr algn="l" fontAlgn="b"/>
+                      <a:r>
+                        <a:rPr lang="en-US" sz="1400" b="0" i="0" u="none" strike="noStrike" dirty="0" err="1">
+                          <a:solidFill>
+                            <a:srgbClr val="000000"/>
+                          </a:solidFill>
+                          <a:effectLst/>
+                          <a:latin typeface="Calibri" panose="020F0502020204030204" pitchFamily="34" charset="0"/>
+                        </a:rPr>
+                        <a:t>projectedDaysOpen</a:t>
+                      </a:r>
+                      <a:endParaRPr lang="en-US" sz="1400" b="0" i="0" u="none" strike="noStrike" dirty="0">
+                        <a:solidFill>
+                          <a:srgbClr val="000000"/>
+                        </a:solidFill>
+                        <a:effectLst/>
+                        <a:latin typeface="Calibri" panose="020F0502020204030204" pitchFamily="34" charset="0"/>
+                      </a:endParaRPr>
+                    </a:p>
+                  </a:txBody>
+                  <a:tcPr marL="4534" marR="4534" marT="4534" marB="0" anchor="b">
+                    <a:lnL w="6350" cap="flat" cmpd="sng" algn="ctr">
+                      <a:solidFill>
+                        <a:srgbClr val="000000"/>
+                      </a:solidFill>
+                      <a:prstDash val="solid"/>
+                      <a:round/>
+                      <a:headEnd type="none" w="med" len="med"/>
+                      <a:tailEnd type="none" w="med" len="med"/>
+                    </a:lnL>
+                    <a:lnR>
+                      <a:noFill/>
+                    </a:lnR>
+                    <a:lnT w="6350" cap="flat" cmpd="sng" algn="ctr">
+                      <a:solidFill>
+                        <a:srgbClr val="000000"/>
+                      </a:solidFill>
+                      <a:prstDash val="solid"/>
+                      <a:round/>
+                      <a:headEnd type="none" w="med" len="med"/>
+                      <a:tailEnd type="none" w="med" len="med"/>
+                    </a:lnT>
+                    <a:lnB w="6350" cap="flat" cmpd="sng" algn="ctr">
+                      <a:solidFill>
+                        <a:srgbClr val="000000"/>
+                      </a:solidFill>
+                      <a:prstDash val="solid"/>
+                      <a:round/>
+                      <a:headEnd type="none" w="med" len="med"/>
+                      <a:tailEnd type="none" w="med" len="med"/>
+                    </a:lnB>
+                  </a:tcPr>
+                </a:tc>
+                <a:tc>
+                  <a:txBody>
+                    <a:bodyPr/>
+                    <a:lstStyle/>
+                    <a:p>
+                      <a:pPr algn="r" fontAlgn="b"/>
+                      <a:r>
+                        <a:rPr lang="en-US" sz="1400" b="0" i="0" u="none" strike="noStrike" dirty="0">
+                          <a:solidFill>
+                            <a:srgbClr val="000000"/>
+                          </a:solidFill>
+                          <a:effectLst/>
+                          <a:latin typeface="Calibri" panose="020F0502020204030204" pitchFamily="34" charset="0"/>
+                        </a:rPr>
+                        <a:t>0.966451126</a:t>
+                      </a:r>
+                    </a:p>
+                  </a:txBody>
+                  <a:tcPr marL="4534" marR="4534" marT="4534" marB="0" anchor="b">
+                    <a:lnL>
+                      <a:noFill/>
+                    </a:lnL>
+                    <a:lnR w="6350" cap="flat" cmpd="sng" algn="ctr">
+                      <a:solidFill>
+                        <a:srgbClr val="000000"/>
+                      </a:solidFill>
+                      <a:prstDash val="solid"/>
+                      <a:round/>
+                      <a:headEnd type="none" w="med" len="med"/>
+                      <a:tailEnd type="none" w="med" len="med"/>
+                    </a:lnR>
+                    <a:lnT w="6350" cap="flat" cmpd="sng" algn="ctr">
+                      <a:solidFill>
+                        <a:srgbClr val="000000"/>
+                      </a:solidFill>
+                      <a:prstDash val="solid"/>
+                      <a:round/>
+                      <a:headEnd type="none" w="med" len="med"/>
+                      <a:tailEnd type="none" w="med" len="med"/>
+                    </a:lnT>
+                    <a:lnB w="6350" cap="flat" cmpd="sng" algn="ctr">
+                      <a:solidFill>
+                        <a:srgbClr val="000000"/>
+                      </a:solidFill>
+                      <a:prstDash val="solid"/>
+                      <a:round/>
+                      <a:headEnd type="none" w="med" len="med"/>
+                      <a:tailEnd type="none" w="med" len="med"/>
+                    </a:lnB>
+                  </a:tcPr>
+                </a:tc>
+                <a:extLst>
+                  <a:ext uri="{0D108BD9-81ED-4DB2-BD59-A6C34878D82A}">
+                    <a16:rowId xmlns:a16="http://schemas.microsoft.com/office/drawing/2014/main" val="3308496281"/>
+                  </a:ext>
+                </a:extLst>
+              </a:tr>
+            </a:tbl>
+          </a:graphicData>
+        </a:graphic>
+      </p:graphicFrame>
     </p:spTree>
     <p:extLst>
       <p:ext uri="{BB962C8B-B14F-4D97-AF65-F5344CB8AC3E}">
@@ -7800,8 +9200,9 @@
           <a:bodyPr/>
           <a:lstStyle/>
           <a:p>
-            <a:r>
-              <a:rPr lang="en-US" dirty="0"/>
+            <a:pPr algn="ctr"/>
+            <a:r>
+              <a:rPr lang="en-US" sz="2400" u="sng" dirty="0"/>
               <a:t>Summary and conclusion</a:t>
             </a:r>
           </a:p>
@@ -7822,7 +9223,7 @@
         <p:spPr>
           <a:xfrm>
             <a:off x="483476" y="861848"/>
-            <a:ext cx="8219090" cy="4401205"/>
+            <a:ext cx="8219090" cy="3970318"/>
           </a:xfrm>
           <a:prstGeom prst="rect">
             <a:avLst/>
@@ -7837,11 +9238,8 @@
           <a:p>
             <a:r>
               <a:rPr lang="en-US" dirty="0"/>
-              <a:t>Using linear regression model to predict Adult Weekend price which resulted in having 81% explained variance.  </a:t>
-            </a:r>
-          </a:p>
-          <a:p>
-            <a:endParaRPr lang="en-US" dirty="0"/>
+              <a:t>  </a:t>
+            </a:r>
           </a:p>
           <a:p>
             <a:r>
@@ -7893,8 +9291,12 @@
           </a:p>
           <a:p>
             <a:r>
+              <a:rPr lang="en-US" u="sng"/>
+              <a:t>Future </a:t>
+            </a:r>
+            <a:r>
               <a:rPr lang="en-US" u="sng" dirty="0"/>
-              <a:t>Recommendations:</a:t>
+              <a:t>Analysis:</a:t>
             </a:r>
           </a:p>
           <a:p>

</xml_diff>